<commit_message>
update slides for this week
</commit_message>
<xml_diff>
--- a/slides/pptx/week02.pptx
+++ b/slides/pptx/week02.pptx
@@ -39,7 +39,6 @@
     <p:sldId id="287" r:id="rId33"/>
     <p:sldId id="288" r:id="rId34"/>
     <p:sldId id="289" r:id="rId35"/>
-    <p:sldId id="290" r:id="rId36"/>
   </p:sldIdLst>
   <p:sldSz cx="12192000" cy="6858000"/>
   <p:notesSz cx="6858000" cy="9144000"/>
@@ -11971,9 +11970,9 @@
               <a:t>((t) </a:t>
             </a:r>
             <a:r>
-              <a:rPr sz="1800">
-                <a:solidFill>
-                  <a:srgbClr val="666666"/>
+              <a:rPr sz="1800" b="1">
+                <a:solidFill>
+                  <a:srgbClr val="007020"/>
                 </a:solidFill>
                 <a:latin typeface="Courier"/>
               </a:rPr>
@@ -12432,72 +12431,6 @@
 </file>
 
 <file path=ppt/slides/slide34.xml><?xml version="1.0" encoding="utf-8"?>
-<p:sld xmlns:a="http://schemas.openxmlformats.org/drawingml/2006/main" xmlns:r="http://schemas.openxmlformats.org/officeDocument/2006/relationships" xmlns:p="http://schemas.openxmlformats.org/presentationml/2006/main">
-  <p:cSld>
-    <p:spTree>
-      <p:nvGrpSpPr>
-        <p:cNvPr id="1" name=""/>
-        <p:cNvGrpSpPr/>
-        <p:nvPr/>
-      </p:nvGrpSpPr>
-      <p:grpSpPr>
-        <a:xfrm>
-          <a:off x="0" y="0"/>
-          <a:ext cx="0" cy="0"/>
-          <a:chOff x="0" y="0"/>
-          <a:chExt cx="0" cy="0"/>
-        </a:xfrm>
-      </p:grpSpPr>
-      <p:sp>
-        <p:nvSpPr>
-          <p:cNvPr id="2" name="Title 1">
-            <a:extLst>
-              <a:ext uri="{FF2B5EF4-FFF2-40B4-BE49-F238E27FC236}">
-                <a16:creationId xmlns:a16="http://schemas.microsoft.com/office/drawing/2014/main" id="{A961E8F3-2071-45E9-B9B2-2CC1494E6117}"/>
-              </a:ext>
-            </a:extLst>
-          </p:cNvPr>
-          <p:cNvSpPr>
-            <a:spLocks noGrp="1"/>
-          </p:cNvSpPr>
-          <p:nvPr>
-            <p:ph type="title"/>
-          </p:nvPr>
-        </p:nvSpPr>
-        <p:spPr>
-          <a:xfrm>
-            <a:off x="831850" y="1709738"/>
-            <a:ext cx="10515600" cy="2852737"/>
-          </a:xfrm>
-        </p:spPr>
-        <p:txBody>
-          <a:bodyPr/>
-          <a:lstStyle/>
-          <a:p>
-            <a:pPr lvl="0" marL="0" indent="0">
-              <a:buNone/>
-            </a:pPr>
-            <a:r>
-              <a:rPr/>
-              <a:t>Hybrid</a:t>
-            </a:r>
-            <a:r>
-              <a:rPr/>
-              <a:t> </a:t>
-            </a:r>
-            <a:r>
-              <a:rPr/>
-              <a:t>Topics</a:t>
-            </a:r>
-          </a:p>
-        </p:txBody>
-      </p:sp>
-    </p:spTree>
-  </p:cSld>
-</p:sld>
-</file>
-
-<file path=ppt/slides/slide35.xml><?xml version="1.0" encoding="utf-8"?>
 <p:sld xmlns:a="http://schemas.openxmlformats.org/drawingml/2006/main" xmlns:r="http://schemas.openxmlformats.org/officeDocument/2006/relationships" xmlns:p="http://schemas.openxmlformats.org/presentationml/2006/main">
   <p:cSld>
     <p:spTree>
@@ -12540,7 +12473,7 @@
             </a:pPr>
             <a:r>
               <a:rPr/>
-              <a:t>Ray</a:t>
+              <a:t>Hybrid</a:t>
             </a:r>
             <a:r>
               <a:rPr/>
@@ -12548,7 +12481,7 @@
             </a:r>
             <a:r>
               <a:rPr/>
-              <a:t>Tracing</a:t>
+              <a:t>Topics</a:t>
             </a:r>
           </a:p>
         </p:txBody>
@@ -12573,6 +12506,13 @@
         <p:txBody>
           <a:bodyPr/>
           <a:lstStyle/>
+          <a:p>
+            <a:pPr lvl="1"/>
+            <a:r>
+              <a:rPr/>
+              <a:t>Ray Tracing</a:t>
+            </a:r>
+          </a:p>
           <a:p>
             <a:pPr lvl="1"/>
             <a:r>

</xml_diff>